<commit_message>
updated readme and power point
</commit_message>
<xml_diff>
--- a/O3_presentation.pptx
+++ b/O3_presentation.pptx
@@ -5,7 +5,7 @@
     <p:sldMasterId id="2147483648" r:id="rId1"/>
   </p:sldMasterIdLst>
   <p:notesMasterIdLst>
-    <p:notesMasterId r:id="rId12"/>
+    <p:notesMasterId r:id="rId14"/>
   </p:notesMasterIdLst>
   <p:sldIdLst>
     <p:sldId id="256" r:id="rId2"/>
@@ -18,6 +18,8 @@
     <p:sldId id="263" r:id="rId9"/>
     <p:sldId id="266" r:id="rId10"/>
     <p:sldId id="264" r:id="rId11"/>
+    <p:sldId id="267" r:id="rId12"/>
+    <p:sldId id="268" r:id="rId13"/>
   </p:sldIdLst>
   <p:sldSz cx="12192000" cy="6858000"/>
   <p:notesSz cx="6858000" cy="9144000"/>
@@ -4374,10 +4376,544 @@
           </a:p>
         </p:txBody>
       </p:sp>
+      <p:sp>
+        <p:nvSpPr>
+          <p:cNvPr id="7" name="TextBox 6">
+            <a:extLst>
+              <a:ext uri="{FF2B5EF4-FFF2-40B4-BE49-F238E27FC236}">
+                <a16:creationId xmlns:a16="http://schemas.microsoft.com/office/drawing/2014/main" id="{E294B2D5-8191-4141-9410-7BE3D61100BC}"/>
+              </a:ext>
+            </a:extLst>
+          </p:cNvPr>
+          <p:cNvSpPr txBox="1"/>
+          <p:nvPr/>
+        </p:nvSpPr>
+        <p:spPr>
+          <a:xfrm>
+            <a:off x="610286" y="2102737"/>
+            <a:ext cx="936667" cy="369332"/>
+          </a:xfrm>
+          <a:prstGeom prst="rect">
+            <a:avLst/>
+          </a:prstGeom>
+          <a:noFill/>
+        </p:spPr>
+        <p:txBody>
+          <a:bodyPr wrap="none" rtlCol="0">
+            <a:spAutoFit/>
+          </a:bodyPr>
+          <a:lstStyle/>
+          <a:p>
+            <a:r>
+              <a:rPr lang="en-AU" dirty="0"/>
+              <a:t>Figure 3</a:t>
+            </a:r>
+          </a:p>
+        </p:txBody>
+      </p:sp>
+      <p:sp>
+        <p:nvSpPr>
+          <p:cNvPr id="8" name="TextBox 7">
+            <a:extLst>
+              <a:ext uri="{FF2B5EF4-FFF2-40B4-BE49-F238E27FC236}">
+                <a16:creationId xmlns:a16="http://schemas.microsoft.com/office/drawing/2014/main" id="{1FBE8D08-EA17-45BB-9D3E-4FBD351A3EDC}"/>
+              </a:ext>
+            </a:extLst>
+          </p:cNvPr>
+          <p:cNvSpPr txBox="1"/>
+          <p:nvPr/>
+        </p:nvSpPr>
+        <p:spPr>
+          <a:xfrm>
+            <a:off x="10305115" y="2247242"/>
+            <a:ext cx="936667" cy="369332"/>
+          </a:xfrm>
+          <a:prstGeom prst="rect">
+            <a:avLst/>
+          </a:prstGeom>
+          <a:noFill/>
+        </p:spPr>
+        <p:txBody>
+          <a:bodyPr wrap="none" rtlCol="0">
+            <a:spAutoFit/>
+          </a:bodyPr>
+          <a:lstStyle/>
+          <a:p>
+            <a:r>
+              <a:rPr lang="en-AU" dirty="0"/>
+              <a:t>Figure 4</a:t>
+            </a:r>
+          </a:p>
+        </p:txBody>
+      </p:sp>
     </p:spTree>
     <p:extLst>
       <p:ext uri="{BB962C8B-B14F-4D97-AF65-F5344CB8AC3E}">
         <p14:creationId xmlns:p14="http://schemas.microsoft.com/office/powerpoint/2010/main" val="4055451469"/>
+      </p:ext>
+    </p:extLst>
+  </p:cSld>
+  <p:clrMapOvr>
+    <a:masterClrMapping/>
+  </p:clrMapOvr>
+</p:sld>
+</file>
+
+<file path=ppt/slides/slide11.xml><?xml version="1.0" encoding="utf-8"?>
+<p:sld xmlns:a="http://schemas.openxmlformats.org/drawingml/2006/main" xmlns:r="http://schemas.openxmlformats.org/officeDocument/2006/relationships" xmlns:p="http://schemas.openxmlformats.org/presentationml/2006/main">
+  <p:cSld>
+    <p:spTree>
+      <p:nvGrpSpPr>
+        <p:cNvPr id="1" name=""/>
+        <p:cNvGrpSpPr/>
+        <p:nvPr/>
+      </p:nvGrpSpPr>
+      <p:grpSpPr>
+        <a:xfrm>
+          <a:off x="0" y="0"/>
+          <a:ext cx="0" cy="0"/>
+          <a:chOff x="0" y="0"/>
+          <a:chExt cx="0" cy="0"/>
+        </a:xfrm>
+      </p:grpSpPr>
+      <p:sp>
+        <p:nvSpPr>
+          <p:cNvPr id="2" name="Title 1">
+            <a:extLst>
+              <a:ext uri="{FF2B5EF4-FFF2-40B4-BE49-F238E27FC236}">
+                <a16:creationId xmlns:a16="http://schemas.microsoft.com/office/drawing/2014/main" id="{CF7AD49B-3D93-45AA-AEAD-D5F5973A12C3}"/>
+              </a:ext>
+            </a:extLst>
+          </p:cNvPr>
+          <p:cNvSpPr>
+            <a:spLocks noGrp="1"/>
+          </p:cNvSpPr>
+          <p:nvPr>
+            <p:ph type="title"/>
+          </p:nvPr>
+        </p:nvSpPr>
+        <p:spPr/>
+        <p:txBody>
+          <a:bodyPr>
+            <a:normAutofit/>
+          </a:bodyPr>
+          <a:lstStyle/>
+          <a:p>
+            <a:r>
+              <a:rPr lang="en-US" sz="1600" b="0" i="0" dirty="0">
+                <a:solidFill>
+                  <a:srgbClr val="000000"/>
+                </a:solidFill>
+                <a:effectLst/>
+                <a:latin typeface="Helvetica Neue"/>
+              </a:rPr>
+              <a:t>It is clearly visibly that there is a strong positive correlation between the use of personal vehicle and the obesity rate.</a:t>
+            </a:r>
+            <a:endParaRPr lang="en-AU" sz="1600" dirty="0"/>
+          </a:p>
+        </p:txBody>
+      </p:sp>
+      <p:pic>
+        <p:nvPicPr>
+          <p:cNvPr id="5" name="Content Placeholder 4" descr="Chart, scatter chart&#10;&#10;Description automatically generated">
+            <a:extLst>
+              <a:ext uri="{FF2B5EF4-FFF2-40B4-BE49-F238E27FC236}">
+                <a16:creationId xmlns:a16="http://schemas.microsoft.com/office/drawing/2014/main" id="{45D30DE5-A06E-49E9-90F7-79675A717E8C}"/>
+              </a:ext>
+            </a:extLst>
+          </p:cNvPr>
+          <p:cNvPicPr>
+            <a:picLocks noGrp="1" noChangeAspect="1"/>
+          </p:cNvPicPr>
+          <p:nvPr>
+            <p:ph idx="1"/>
+          </p:nvPr>
+        </p:nvPicPr>
+        <p:blipFill>
+          <a:blip r:embed="rId2">
+            <a:extLst>
+              <a:ext uri="{28A0092B-C50C-407E-A947-70E740481C1C}">
+                <a14:useLocalDpi xmlns:a14="http://schemas.microsoft.com/office/drawing/2010/main" val="0"/>
+              </a:ext>
+            </a:extLst>
+          </a:blip>
+          <a:stretch>
+            <a:fillRect/>
+          </a:stretch>
+        </p:blipFill>
+        <p:spPr>
+          <a:xfrm>
+            <a:off x="610286" y="2540168"/>
+            <a:ext cx="5485714" cy="3657143"/>
+          </a:xfrm>
+        </p:spPr>
+      </p:pic>
+      <p:sp>
+        <p:nvSpPr>
+          <p:cNvPr id="7" name="Rectangle 1">
+            <a:extLst>
+              <a:ext uri="{FF2B5EF4-FFF2-40B4-BE49-F238E27FC236}">
+                <a16:creationId xmlns:a16="http://schemas.microsoft.com/office/drawing/2014/main" id="{BAB670D3-366E-4C4E-AF6E-268F651FF3D3}"/>
+              </a:ext>
+            </a:extLst>
+          </p:cNvPr>
+          <p:cNvSpPr>
+            <a:spLocks noChangeArrowheads="1"/>
+          </p:cNvSpPr>
+          <p:nvPr/>
+        </p:nvSpPr>
+        <p:spPr bwMode="auto">
+          <a:xfrm>
+            <a:off x="1124125" y="2295696"/>
+            <a:ext cx="3613169" cy="307777"/>
+          </a:xfrm>
+          <a:prstGeom prst="rect">
+            <a:avLst/>
+          </a:prstGeom>
+          <a:solidFill>
+            <a:srgbClr val="FFFFFF"/>
+          </a:solidFill>
+          <a:ln>
+            <a:noFill/>
+          </a:ln>
+          <a:effectLst/>
+          <a:extLst>
+            <a:ext uri="{91240B29-F687-4F45-9708-019B960494DF}">
+              <a14:hiddenLine xmlns:a14="http://schemas.microsoft.com/office/drawing/2010/main" w="9525">
+                <a:solidFill>
+                  <a:schemeClr val="tx1"/>
+                </a:solidFill>
+                <a:miter lim="800000"/>
+                <a:headEnd/>
+                <a:tailEnd/>
+              </a14:hiddenLine>
+            </a:ext>
+            <a:ext uri="{AF507438-7753-43E0-B8FC-AC1667EBCBE1}">
+              <a14:hiddenEffects xmlns:a14="http://schemas.microsoft.com/office/drawing/2010/main">
+                <a:effectLst>
+                  <a:outerShdw dist="35921" dir="2700000" algn="ctr" rotWithShape="0">
+                    <a:schemeClr val="bg2"/>
+                  </a:outerShdw>
+                </a:effectLst>
+              </a14:hiddenEffects>
+            </a:ext>
+          </a:extLst>
+        </p:spPr>
+        <p:txBody>
+          <a:bodyPr vert="horz" wrap="none" lIns="0" tIns="0" rIns="0" bIns="0" numCol="1" anchor="ctr" anchorCtr="0" compatLnSpc="1">
+            <a:prstTxWarp prst="textNoShape">
+              <a:avLst/>
+            </a:prstTxWarp>
+            <a:spAutoFit/>
+          </a:bodyPr>
+          <a:lstStyle/>
+          <a:p>
+            <a:pPr marL="0" marR="0" lvl="0" indent="0" algn="l" defTabSz="914400" rtl="0" eaLnBrk="0" fontAlgn="base" latinLnBrk="0" hangingPunct="0">
+              <a:lnSpc>
+                <a:spcPct val="100000"/>
+              </a:lnSpc>
+              <a:spcBef>
+                <a:spcPct val="0"/>
+              </a:spcBef>
+              <a:spcAft>
+                <a:spcPct val="0"/>
+              </a:spcAft>
+              <a:buClrTx/>
+              <a:buSzTx/>
+              <a:buFontTx/>
+              <a:buNone/>
+              <a:tabLst/>
+            </a:pPr>
+            <a:r>
+              <a:rPr kumimoji="0" lang="en-US" altLang="en-US" sz="1000" b="0" i="0" u="none" strike="noStrike" cap="none" normalizeH="0" baseline="0" dirty="0">
+                <a:ln>
+                  <a:noFill/>
+                </a:ln>
+                <a:solidFill>
+                  <a:srgbClr val="000000"/>
+                </a:solidFill>
+                <a:effectLst/>
+                <a:latin typeface="Helvetica Neue"/>
+              </a:rPr>
+              <a:t>The correlation coefficient between obesity and Walked is -0.49 </a:t>
+            </a:r>
+          </a:p>
+          <a:p>
+            <a:pPr marL="0" marR="0" lvl="0" indent="0" algn="l" defTabSz="914400" rtl="0" eaLnBrk="0" fontAlgn="base" latinLnBrk="0" hangingPunct="0">
+              <a:lnSpc>
+                <a:spcPct val="100000"/>
+              </a:lnSpc>
+              <a:spcBef>
+                <a:spcPct val="0"/>
+              </a:spcBef>
+              <a:spcAft>
+                <a:spcPct val="0"/>
+              </a:spcAft>
+              <a:buClrTx/>
+              <a:buSzTx/>
+              <a:buFontTx/>
+              <a:buNone/>
+              <a:tabLst/>
+            </a:pPr>
+            <a:r>
+              <a:rPr lang="en-US" altLang="en-US" sz="1000" dirty="0">
+                <a:solidFill>
+                  <a:srgbClr val="000000"/>
+                </a:solidFill>
+                <a:latin typeface="Helvetica Neue"/>
+              </a:rPr>
+              <a:t>Line equation </a:t>
+            </a:r>
+            <a:r>
+              <a:rPr kumimoji="0" lang="en-US" altLang="en-US" sz="1000" b="0" i="0" u="none" strike="noStrike" cap="none" normalizeH="0" baseline="0" dirty="0">
+                <a:ln>
+                  <a:noFill/>
+                </a:ln>
+                <a:solidFill>
+                  <a:srgbClr val="000000"/>
+                </a:solidFill>
+                <a:effectLst/>
+                <a:latin typeface="Helvetica Neue"/>
+              </a:rPr>
+              <a:t>= -1.55x + 35.7</a:t>
+            </a:r>
+            <a:r>
+              <a:rPr kumimoji="0" lang="en-US" altLang="en-US" sz="1000" b="0" i="0" u="none" strike="noStrike" cap="none" normalizeH="0" baseline="0" dirty="0">
+                <a:ln>
+                  <a:noFill/>
+                </a:ln>
+                <a:solidFill>
+                  <a:schemeClr val="tx1"/>
+                </a:solidFill>
+                <a:effectLst/>
+                <a:latin typeface="Helvetica Neue"/>
+              </a:rPr>
+              <a:t> </a:t>
+            </a:r>
+          </a:p>
+        </p:txBody>
+      </p:sp>
+      <p:sp>
+        <p:nvSpPr>
+          <p:cNvPr id="6" name="TextBox 5">
+            <a:extLst>
+              <a:ext uri="{FF2B5EF4-FFF2-40B4-BE49-F238E27FC236}">
+                <a16:creationId xmlns:a16="http://schemas.microsoft.com/office/drawing/2014/main" id="{A6EFAE5F-C78D-419B-9A64-93F3A6885481}"/>
+              </a:ext>
+            </a:extLst>
+          </p:cNvPr>
+          <p:cNvSpPr txBox="1"/>
+          <p:nvPr/>
+        </p:nvSpPr>
+        <p:spPr>
+          <a:xfrm>
+            <a:off x="536196" y="1863934"/>
+            <a:ext cx="936667" cy="369332"/>
+          </a:xfrm>
+          <a:prstGeom prst="rect">
+            <a:avLst/>
+          </a:prstGeom>
+          <a:noFill/>
+        </p:spPr>
+        <p:txBody>
+          <a:bodyPr wrap="none" rtlCol="0">
+            <a:spAutoFit/>
+          </a:bodyPr>
+          <a:lstStyle/>
+          <a:p>
+            <a:r>
+              <a:rPr lang="en-AU" dirty="0"/>
+              <a:t>Figure 5</a:t>
+            </a:r>
+          </a:p>
+        </p:txBody>
+      </p:sp>
+    </p:spTree>
+    <p:extLst>
+      <p:ext uri="{BB962C8B-B14F-4D97-AF65-F5344CB8AC3E}">
+        <p14:creationId xmlns:p14="http://schemas.microsoft.com/office/powerpoint/2010/main" val="3681075028"/>
+      </p:ext>
+    </p:extLst>
+  </p:cSld>
+  <p:clrMapOvr>
+    <a:masterClrMapping/>
+  </p:clrMapOvr>
+</p:sld>
+</file>
+
+<file path=ppt/slides/slide12.xml><?xml version="1.0" encoding="utf-8"?>
+<p:sld xmlns:a="http://schemas.openxmlformats.org/drawingml/2006/main" xmlns:r="http://schemas.openxmlformats.org/officeDocument/2006/relationships" xmlns:p="http://schemas.openxmlformats.org/presentationml/2006/main">
+  <p:cSld>
+    <p:spTree>
+      <p:nvGrpSpPr>
+        <p:cNvPr id="1" name=""/>
+        <p:cNvGrpSpPr/>
+        <p:nvPr/>
+      </p:nvGrpSpPr>
+      <p:grpSpPr>
+        <a:xfrm>
+          <a:off x="0" y="0"/>
+          <a:ext cx="0" cy="0"/>
+          <a:chOff x="0" y="0"/>
+          <a:chExt cx="0" cy="0"/>
+        </a:xfrm>
+      </p:grpSpPr>
+      <p:sp>
+        <p:nvSpPr>
+          <p:cNvPr id="2" name="Title 1">
+            <a:extLst>
+              <a:ext uri="{FF2B5EF4-FFF2-40B4-BE49-F238E27FC236}">
+                <a16:creationId xmlns:a16="http://schemas.microsoft.com/office/drawing/2014/main" id="{668B8562-ED74-4065-904A-69B90A389396}"/>
+              </a:ext>
+            </a:extLst>
+          </p:cNvPr>
+          <p:cNvSpPr>
+            <a:spLocks noGrp="1"/>
+          </p:cNvSpPr>
+          <p:nvPr>
+            <p:ph type="title"/>
+          </p:nvPr>
+        </p:nvSpPr>
+        <p:spPr/>
+        <p:txBody>
+          <a:bodyPr/>
+          <a:lstStyle/>
+          <a:p>
+            <a:r>
+              <a:rPr lang="en-AU" dirty="0"/>
+              <a:t>Result</a:t>
+            </a:r>
+          </a:p>
+        </p:txBody>
+      </p:sp>
+      <p:sp>
+        <p:nvSpPr>
+          <p:cNvPr id="3" name="Content Placeholder 2">
+            <a:extLst>
+              <a:ext uri="{FF2B5EF4-FFF2-40B4-BE49-F238E27FC236}">
+                <a16:creationId xmlns:a16="http://schemas.microsoft.com/office/drawing/2014/main" id="{016FD7FB-1BAB-4E57-9B54-52E8E4BA165E}"/>
+              </a:ext>
+            </a:extLst>
+          </p:cNvPr>
+          <p:cNvSpPr>
+            <a:spLocks noGrp="1"/>
+          </p:cNvSpPr>
+          <p:nvPr>
+            <p:ph idx="1"/>
+          </p:nvPr>
+        </p:nvSpPr>
+        <p:spPr/>
+        <p:txBody>
+          <a:bodyPr>
+            <a:normAutofit/>
+          </a:bodyPr>
+          <a:lstStyle/>
+          <a:p>
+            <a:r>
+              <a:rPr lang="en-AU" sz="2200" dirty="0">
+                <a:latin typeface="Helvetica Neue"/>
+              </a:rPr>
+              <a:t>Data on mode of commute and obesity are used to generate above analysis report for all the states in America.</a:t>
+            </a:r>
+          </a:p>
+          <a:p>
+            <a:r>
+              <a:rPr lang="en-AU" sz="2200" dirty="0">
+                <a:latin typeface="Helvetica Neue"/>
+              </a:rPr>
+              <a:t>Figure 1 show the distribution of mode of commute in different states and clearly shows the preferred mode of commute is drive alone or carpool, which constitute for 87.9% of the total population.</a:t>
+            </a:r>
+          </a:p>
+          <a:p>
+            <a:r>
+              <a:rPr lang="en-AU" sz="2200" dirty="0">
+                <a:latin typeface="Helvetica Neue"/>
+              </a:rPr>
+              <a:t>Most of the studies conducted regarding the relationship between obesity and walkability show a negative correlation. To confirm this hypothesis, we have included one of the study conducted by </a:t>
+            </a:r>
+            <a:r>
+              <a:rPr lang="en-US" sz="2200" b="0" i="0" dirty="0">
+                <a:solidFill>
+                  <a:srgbClr val="000000"/>
+                </a:solidFill>
+                <a:effectLst/>
+                <a:latin typeface="Helvetica Neue"/>
+              </a:rPr>
+              <a:t>Li Ming Wen and Chris </a:t>
+            </a:r>
+            <a:r>
+              <a:rPr lang="en-US" sz="2200" b="0" i="0" dirty="0" err="1">
+                <a:solidFill>
+                  <a:srgbClr val="000000"/>
+                </a:solidFill>
+                <a:effectLst/>
+                <a:latin typeface="Helvetica Neue"/>
+              </a:rPr>
+              <a:t>Rissel</a:t>
+            </a:r>
+            <a:r>
+              <a:rPr lang="en-US" sz="2200" dirty="0">
+                <a:solidFill>
+                  <a:srgbClr val="000000"/>
+                </a:solidFill>
+                <a:latin typeface="Helvetica Neue"/>
+              </a:rPr>
+              <a:t>.</a:t>
+            </a:r>
+          </a:p>
+          <a:p>
+            <a:r>
+              <a:rPr lang="en-US" sz="2200" dirty="0">
+                <a:solidFill>
+                  <a:srgbClr val="000000"/>
+                </a:solidFill>
+                <a:latin typeface="Helvetica Neue"/>
+              </a:rPr>
+              <a:t>Figure 3,4,5 shows the correlation between use of public transport, walking and drive to commute verses obesity, and based on </a:t>
+            </a:r>
+            <a:r>
+              <a:rPr lang="en-US" sz="2200" b="0" i="0" dirty="0">
+                <a:solidFill>
+                  <a:srgbClr val="000000"/>
+                </a:solidFill>
+                <a:effectLst/>
+                <a:latin typeface="Helvetica Neue"/>
+              </a:rPr>
+              <a:t>Li Ming Wen and Chris </a:t>
+            </a:r>
+            <a:r>
+              <a:rPr lang="en-US" sz="2200" b="0" i="0" dirty="0" err="1">
+                <a:solidFill>
+                  <a:srgbClr val="000000"/>
+                </a:solidFill>
+                <a:effectLst/>
+                <a:latin typeface="Helvetica Neue"/>
+              </a:rPr>
+              <a:t>Rissel</a:t>
+            </a:r>
+            <a:r>
+              <a:rPr lang="en-US" sz="2200" b="0" i="0" dirty="0">
+                <a:solidFill>
+                  <a:srgbClr val="000000"/>
+                </a:solidFill>
+                <a:effectLst/>
+                <a:latin typeface="Helvetica Neue"/>
+              </a:rPr>
+              <a:t> we can confirm that use of Public transport and walkability have a moderate negative correlation and driving has high positive correlation. </a:t>
+            </a:r>
+            <a:endParaRPr lang="en-AU" sz="2200" dirty="0">
+              <a:latin typeface="Helvetica Neue"/>
+            </a:endParaRPr>
+          </a:p>
+          <a:p>
+            <a:endParaRPr lang="en-AU" dirty="0"/>
+          </a:p>
+        </p:txBody>
+      </p:sp>
+    </p:spTree>
+    <p:extLst>
+      <p:ext uri="{BB962C8B-B14F-4D97-AF65-F5344CB8AC3E}">
+        <p14:creationId xmlns:p14="http://schemas.microsoft.com/office/powerpoint/2010/main" val="1221942051"/>
       </p:ext>
     </p:extLst>
   </p:cSld>
@@ -5977,6 +6513,41 @@
           </a:p>
         </p:txBody>
       </p:sp>
+      <p:sp>
+        <p:nvSpPr>
+          <p:cNvPr id="3" name="TextBox 2">
+            <a:extLst>
+              <a:ext uri="{FF2B5EF4-FFF2-40B4-BE49-F238E27FC236}">
+                <a16:creationId xmlns:a16="http://schemas.microsoft.com/office/drawing/2014/main" id="{39E232F9-AED3-40B3-88C1-CDD6DE08A481}"/>
+              </a:ext>
+            </a:extLst>
+          </p:cNvPr>
+          <p:cNvSpPr txBox="1"/>
+          <p:nvPr/>
+        </p:nvSpPr>
+        <p:spPr>
+          <a:xfrm>
+            <a:off x="838200" y="1135660"/>
+            <a:ext cx="1048685" cy="369332"/>
+          </a:xfrm>
+          <a:prstGeom prst="rect">
+            <a:avLst/>
+          </a:prstGeom>
+          <a:noFill/>
+        </p:spPr>
+        <p:txBody>
+          <a:bodyPr wrap="none" rtlCol="0">
+            <a:spAutoFit/>
+          </a:bodyPr>
+          <a:lstStyle/>
+          <a:p>
+            <a:r>
+              <a:rPr lang="en-AU" dirty="0"/>
+              <a:t>FIGURE 1</a:t>
+            </a:r>
+          </a:p>
+        </p:txBody>
+      </p:sp>
     </p:spTree>
     <p:extLst>
       <p:ext uri="{BB962C8B-B14F-4D97-AF65-F5344CB8AC3E}">
@@ -6023,7 +6594,12 @@
             <p:ph type="title"/>
           </p:nvPr>
         </p:nvSpPr>
-        <p:spPr/>
+        <p:spPr>
+          <a:xfrm>
+            <a:off x="838200" y="365126"/>
+            <a:ext cx="10515600" cy="977114"/>
+          </a:xfrm>
+        </p:spPr>
         <p:txBody>
           <a:bodyPr>
             <a:normAutofit/>
@@ -6074,11 +6650,46 @@
         </p:blipFill>
         <p:spPr>
           <a:xfrm>
-            <a:off x="912090" y="1487488"/>
+            <a:off x="838200" y="1504992"/>
             <a:ext cx="10997536" cy="4802187"/>
           </a:xfrm>
         </p:spPr>
       </p:pic>
+      <p:sp>
+        <p:nvSpPr>
+          <p:cNvPr id="4" name="TextBox 3">
+            <a:extLst>
+              <a:ext uri="{FF2B5EF4-FFF2-40B4-BE49-F238E27FC236}">
+                <a16:creationId xmlns:a16="http://schemas.microsoft.com/office/drawing/2014/main" id="{091D18A2-7449-4F78-9285-0969589C1833}"/>
+              </a:ext>
+            </a:extLst>
+          </p:cNvPr>
+          <p:cNvSpPr txBox="1"/>
+          <p:nvPr/>
+        </p:nvSpPr>
+        <p:spPr>
+          <a:xfrm>
+            <a:off x="838200" y="1135660"/>
+            <a:ext cx="1048685" cy="369332"/>
+          </a:xfrm>
+          <a:prstGeom prst="rect">
+            <a:avLst/>
+          </a:prstGeom>
+          <a:noFill/>
+        </p:spPr>
+        <p:txBody>
+          <a:bodyPr wrap="none" rtlCol="0">
+            <a:spAutoFit/>
+          </a:bodyPr>
+          <a:lstStyle/>
+          <a:p>
+            <a:r>
+              <a:rPr lang="en-AU" dirty="0"/>
+              <a:t>FIGURE 2</a:t>
+            </a:r>
+          </a:p>
+        </p:txBody>
+      </p:sp>
     </p:spTree>
     <p:extLst>
       <p:ext uri="{BB962C8B-B14F-4D97-AF65-F5344CB8AC3E}">

</xml_diff>